<commit_message>
Fixing vdev for ZFS for Dummies
</commit_message>
<xml_diff>
--- a/static/img/zfs-cheat-sheet-for-dummies/zfs.pptx
+++ b/static/img/zfs-cheat-sheet-for-dummies/zfs.pptx
@@ -3715,10 +3715,10 @@
           <a:p>
             <a:pPr algn="ctr"/>
             <a:r>
-              <a:rPr lang="" altLang="en-US"/>
+              <a:rPr lang="en-US" altLang="en-US"/>
               <a:t>VDEV</a:t>
             </a:r>
-            <a:endParaRPr lang="" altLang="en-US"/>
+            <a:endParaRPr lang="en-US" altLang="en-US"/>
           </a:p>
         </p:txBody>
       </p:sp>
@@ -3761,10 +3761,10 @@
           <a:p>
             <a:pPr algn="ctr"/>
             <a:r>
-              <a:rPr lang="" altLang="en-US"/>
+              <a:rPr lang="en-US" altLang="en-US"/>
               <a:t>VDEV</a:t>
             </a:r>
-            <a:endParaRPr lang="" altLang="en-US"/>
+            <a:endParaRPr lang="en-US" altLang="en-US"/>
           </a:p>
         </p:txBody>
       </p:sp>
@@ -3818,8 +3818,7 @@
           <a:p>
             <a:pPr algn="ctr"/>
             <a:r>
-              <a:rPr lang="" altLang="en-US">
-                <a:ln/>
+              <a:rPr lang="en-US" altLang="en-US">
                 <a:solidFill>
                   <a:schemeClr val="tx1">
                     <a:lumMod val="85000"/>
@@ -3836,8 +3835,7 @@
               </a:rPr>
               <a:t>ZPOOL</a:t>
             </a:r>
-            <a:endParaRPr lang="" altLang="en-US">
-              <a:ln/>
+            <a:endParaRPr lang="en-US" altLang="en-US">
               <a:solidFill>
                 <a:schemeClr val="tx1">
                   <a:lumMod val="85000"/>
@@ -3907,8 +3905,7 @@
           <a:p>
             <a:pPr algn="ctr"/>
             <a:r>
-              <a:rPr lang="" altLang="en-US" sz="1600">
-                <a:ln/>
+              <a:rPr lang="en-US" altLang="en-US" sz="1600">
                 <a:solidFill>
                   <a:schemeClr val="tx1">
                     <a:lumMod val="85000"/>
@@ -3925,8 +3922,7 @@
               </a:rPr>
               <a:t>Dataset</a:t>
             </a:r>
-            <a:endParaRPr lang="" altLang="en-US" sz="1600">
-              <a:ln/>
+            <a:endParaRPr lang="en-US" altLang="en-US" sz="1600">
               <a:solidFill>
                 <a:schemeClr val="tx1">
                   <a:lumMod val="85000"/>
@@ -4170,7 +4166,7 @@
           <a:p>
             <a:pPr algn="ctr"/>
             <a:r>
-              <a:rPr lang="" altLang="en-US" sz="1600">
+              <a:rPr lang="en-US" altLang="en-US" sz="1600">
                 <a:solidFill>
                   <a:schemeClr val="tx1">
                     <a:lumMod val="85000"/>
@@ -4187,7 +4183,7 @@
               </a:rPr>
               <a:t>ZVOL</a:t>
             </a:r>
-            <a:endParaRPr lang="" altLang="en-US" sz="1600">
+            <a:endParaRPr lang="en-US" altLang="en-US" sz="1600">
               <a:solidFill>
                 <a:schemeClr val="tx1">
                   <a:lumMod val="85000"/>
@@ -5479,10 +5475,10 @@
           </a:bodyPr>
           <a:p>
             <a:r>
-              <a:rPr lang="" altLang="en-US"/>
+              <a:rPr lang="en-US" altLang="en-US"/>
               <a:t>Single</a:t>
             </a:r>
-            <a:endParaRPr lang="" altLang="en-US"/>
+            <a:endParaRPr lang="en-US" altLang="en-US"/>
           </a:p>
         </p:txBody>
       </p:sp>
@@ -5508,10 +5504,10 @@
           </a:bodyPr>
           <a:p>
             <a:r>
-              <a:rPr lang="" altLang="en-US"/>
+              <a:rPr lang="en-US" altLang="en-US"/>
               <a:t>Mirror</a:t>
             </a:r>
-            <a:endParaRPr lang="" altLang="en-US"/>
+            <a:endParaRPr lang="en-US" altLang="en-US"/>
           </a:p>
         </p:txBody>
       </p:sp>
@@ -5523,8 +5519,8 @@
         </p:nvSpPr>
         <p:spPr>
           <a:xfrm>
-            <a:off x="4222115" y="377190"/>
-            <a:ext cx="932180" cy="368300"/>
+            <a:off x="4152265" y="377190"/>
+            <a:ext cx="1071880" cy="368300"/>
           </a:xfrm>
           <a:prstGeom prst="rect">
             <a:avLst/>
@@ -5537,8 +5533,20 @@
           </a:bodyPr>
           <a:p>
             <a:r>
+              <a:rPr lang="en-US" altLang="en-US"/>
+              <a:t>RAID</a:t>
+            </a:r>
+            <a:r>
               <a:rPr lang="" altLang="en-US"/>
-              <a:t>RAID-0</a:t>
+              <a:t>Z</a:t>
+            </a:r>
+            <a:r>
+              <a:rPr lang="en-US" altLang="en-US"/>
+              <a:t>-</a:t>
+            </a:r>
+            <a:r>
+              <a:rPr lang="" altLang="en-US"/>
+              <a:t>1</a:t>
             </a:r>
             <a:endParaRPr lang="" altLang="en-US"/>
           </a:p>
@@ -5722,17 +5730,13 @@
               <a:pPr algn="ctr"/>
               <a:r>
                 <a:rPr lang="en-US" altLang="en-US" sz="1600"/>
-                <a:t>VDEV</a:t>
+                <a:t>VDEV - </a:t>
               </a:r>
               <a:r>
-                <a:rPr lang="" altLang="en-US" sz="1600"/>
-                <a:t> - </a:t>
-              </a:r>
-              <a:r>
-                <a:rPr lang="" altLang="en-US" sz="1200"/>
+                <a:rPr lang="en-US" altLang="en-US" sz="1200"/>
                 <a:t>Mirror-0</a:t>
               </a:r>
-              <a:endParaRPr lang="" altLang="en-US" sz="1200"/>
+              <a:endParaRPr lang="en-US" altLang="en-US" sz="1200"/>
             </a:p>
           </p:txBody>
         </p:sp>
@@ -5992,11 +5996,7 @@
               <a:pPr algn="ctr"/>
               <a:r>
                 <a:rPr lang="en-US" altLang="en-US" sz="1600"/>
-                <a:t>VDEV</a:t>
-              </a:r>
-              <a:r>
-                <a:rPr lang="" altLang="en-US" sz="1600"/>
-                <a:t> </a:t>
+                <a:t>VDEV </a:t>
               </a:r>
               <a:r>
                 <a:rPr lang="en-US" altLang="en-US" sz="1600">
@@ -6008,13 +6008,7 @@
                 <a:rPr lang="en-US" altLang="en-US" sz="1200">
                   <a:sym typeface="+mn-ea"/>
                 </a:rPr>
-                <a:t>Mirror-</a:t>
-              </a:r>
-              <a:r>
-                <a:rPr lang="" altLang="en-US" sz="1200">
-                  <a:sym typeface="+mn-ea"/>
-                </a:rPr>
-                <a:t>1</a:t>
+                <a:t>Mirror-1</a:t>
               </a:r>
               <a:endParaRPr lang="en-US" altLang="en-US" sz="1200">
                 <a:sym typeface="+mn-ea"/>
@@ -6278,11 +6272,7 @@
               <a:pPr algn="ctr"/>
               <a:r>
                 <a:rPr lang="en-US" altLang="en-US" sz="1600"/>
-                <a:t>VDEV</a:t>
-              </a:r>
-              <a:r>
-                <a:rPr lang="" altLang="en-US" sz="1600"/>
-                <a:t> </a:t>
+                <a:t>VDEV </a:t>
               </a:r>
               <a:r>
                 <a:rPr lang="en-US" altLang="en-US" sz="1600">
@@ -6294,15 +6284,9 @@
                 <a:rPr lang="en-US" altLang="en-US" sz="1200">
                   <a:sym typeface="+mn-ea"/>
                 </a:rPr>
-                <a:t>Mirror-</a:t>
+                <a:t>Mirror-2</a:t>
               </a:r>
-              <a:r>
-                <a:rPr lang="" altLang="en-US" sz="1200">
-                  <a:sym typeface="+mn-ea"/>
-                </a:rPr>
-                <a:t>2</a:t>
-              </a:r>
-              <a:endParaRPr lang="" altLang="en-US" sz="1200">
+              <a:endParaRPr lang="en-US" altLang="en-US" sz="1200">
                 <a:sym typeface="+mn-ea"/>
               </a:endParaRPr>
             </a:p>
@@ -6409,18 +6393,18 @@
           <a:p>
             <a:pPr algn="ctr"/>
             <a:r>
-              <a:rPr lang="" altLang="en-US"/>
+              <a:rPr lang="en-US" altLang="en-US"/>
               <a:t>RAID-10 (1+0)</a:t>
             </a:r>
-            <a:endParaRPr lang="" altLang="en-US"/>
+            <a:endParaRPr lang="en-US" altLang="en-US"/>
           </a:p>
           <a:p>
             <a:pPr algn="ctr"/>
             <a:r>
-              <a:rPr lang="" altLang="en-US" sz="1200"/>
+              <a:rPr lang="en-US" altLang="en-US" sz="1200"/>
               <a:t>Stripe of mirrors</a:t>
             </a:r>
-            <a:endParaRPr lang="" altLang="en-US" sz="1200"/>
+            <a:endParaRPr lang="en-US" altLang="en-US" sz="1200"/>
           </a:p>
         </p:txBody>
       </p:sp>
@@ -7838,10 +7822,10 @@
                         <a:buNone/>
                       </a:pPr>
                       <a:r>
-                        <a:rPr lang="" altLang="en-US" sz="1600"/>
+                        <a:rPr lang="en-US" altLang="en-US" sz="1600"/>
                         <a:t>Delete Changes B</a:t>
                       </a:r>
-                      <a:endParaRPr lang="" altLang="en-US" sz="1600"/>
+                      <a:endParaRPr lang="en-US" altLang="en-US" sz="1600"/>
                     </a:p>
                   </a:txBody>
                   <a:tcPr>
@@ -7892,15 +7876,15 @@
                         <a:buNone/>
                       </a:pPr>
                       <a:r>
-                        <a:rPr lang="" altLang="en-US" sz="1200" b="1"/>
+                        <a:rPr lang="en-US" altLang="en-US" sz="1200" b="1"/>
                         <a:t>Result:</a:t>
                       </a:r>
                       <a:r>
-                        <a:rPr lang="" altLang="en-US" sz="1200"/>
+                        <a:rPr lang="en-US" altLang="en-US" sz="1200"/>
                         <a:t> Files are shown as deleted to the OS, however they are not really deleted from the storage. You could recover with a rollback of snapshot 2 (</a:t>
                       </a:r>
                       <a:r>
-                        <a:rPr lang="" altLang="en-US" sz="1000" b="1" i="1">
+                        <a:rPr lang="en-US" altLang="en-US" sz="1000" b="1" i="1">
                           <a:solidFill>
                             <a:srgbClr val="FF0000"/>
                           </a:solidFill>
@@ -7908,10 +7892,10 @@
                         <a:t>which will delete changes C</a:t>
                       </a:r>
                       <a:r>
-                        <a:rPr lang="" altLang="en-US" sz="1200"/>
+                        <a:rPr lang="en-US" altLang="en-US" sz="1200"/>
                         <a:t>).</a:t>
                       </a:r>
-                      <a:endParaRPr lang="" altLang="en-US" sz="1200"/>
+                      <a:endParaRPr lang="en-US" altLang="en-US" sz="1200"/>
                     </a:p>
                   </a:txBody>
                   <a:tcPr>
@@ -8023,7 +8007,7 @@
                 </a:rPr>
                 <a:t>Data (A)</a:t>
               </a:r>
-              <a:endParaRPr lang="" altLang="en-US" sz="1200"/>
+              <a:endParaRPr lang="en-US" altLang="en-US" sz="1200"/>
             </a:p>
           </p:txBody>
         </p:sp>
@@ -8074,10 +8058,10 @@
             <a:p>
               <a:pPr algn="ctr"/>
               <a:r>
-                <a:rPr lang="" altLang="en-US" sz="1200"/>
+                <a:rPr lang="en-US" altLang="en-US" sz="1200"/>
                 <a:t>Snapshot 1</a:t>
               </a:r>
-              <a:endParaRPr lang="" altLang="en-US" sz="1200"/>
+              <a:endParaRPr lang="en-US" altLang="en-US" sz="1200"/>
             </a:p>
           </p:txBody>
         </p:sp>
@@ -8135,7 +8119,7 @@
                 </a:rPr>
                 <a:t>Data Changes (B)</a:t>
               </a:r>
-              <a:endParaRPr lang="" altLang="en-US" sz="1200">
+              <a:endParaRPr lang="en-US" altLang="en-US" sz="1200">
                 <a:sym typeface="+mn-ea"/>
               </a:endParaRPr>
             </a:p>
@@ -8189,13 +8173,9 @@
               <a:pPr algn="ctr"/>
               <a:r>
                 <a:rPr lang="en-US" altLang="en-US" sz="1200"/>
-                <a:t>Snapshot </a:t>
+                <a:t>Snapshot 2</a:t>
               </a:r>
-              <a:r>
-                <a:rPr lang="" altLang="en-US" sz="1200"/>
-                <a:t>2</a:t>
-              </a:r>
-              <a:endParaRPr lang="" altLang="en-US" sz="1200"/>
+              <a:endParaRPr lang="en-US" altLang="en-US" sz="1200"/>
             </a:p>
           </p:txBody>
         </p:sp>
@@ -8251,19 +8231,7 @@
                 <a:rPr lang="en-US" altLang="en-US" sz="1200">
                   <a:sym typeface="+mn-ea"/>
                 </a:rPr>
-                <a:t>Data Changes (</a:t>
-              </a:r>
-              <a:r>
-                <a:rPr lang="" altLang="en-US" sz="1200">
-                  <a:sym typeface="+mn-ea"/>
-                </a:rPr>
-                <a:t>C</a:t>
-              </a:r>
-              <a:r>
-                <a:rPr lang="en-US" altLang="en-US" sz="1200">
-                  <a:sym typeface="+mn-ea"/>
-                </a:rPr>
-                <a:t>)</a:t>
+                <a:t>Data Changes (C)</a:t>
               </a:r>
               <a:endParaRPr lang="en-US" altLang="en-US" sz="1200"/>
             </a:p>
@@ -8450,7 +8418,7 @@
                 </a:rPr>
                 <a:t>Data Changes (B)</a:t>
               </a:r>
-              <a:endParaRPr lang="" altLang="en-US" sz="1200">
+              <a:endParaRPr lang="en-US" altLang="en-US" sz="1200">
                 <a:sym typeface="+mn-ea"/>
               </a:endParaRPr>
             </a:p>
@@ -8564,7 +8532,7 @@
                 </a:rPr>
                 <a:t>Data Changes (C)</a:t>
               </a:r>
-              <a:endParaRPr lang="" altLang="en-US" sz="1200">
+              <a:endParaRPr lang="en-US" altLang="en-US" sz="1200">
                 <a:sym typeface="+mn-ea"/>
               </a:endParaRPr>
             </a:p>
@@ -8600,377 +8568,7 @@
                       </a:pPr>
                       <a:r>
                         <a:rPr lang="en-US" altLang="en-US" sz="1600"/>
-                        <a:t>Delete </a:t>
-                      </a:r>
-                      <a:r>
-                        <a:rPr lang="" altLang="en-US" sz="1600"/>
-                        <a:t>Snapshot 2</a:t>
-                      </a:r>
-                      <a:endParaRPr lang="" altLang="en-US" sz="1600"/>
-                    </a:p>
-                  </a:txBody>
-                  <a:tcPr>
-                    <a:lnL w="12700">
-                      <a:solidFill>
-                        <a:schemeClr val="tx1"/>
-                      </a:solidFill>
-                      <a:prstDash val="solid"/>
-                    </a:lnL>
-                    <a:lnR w="12700">
-                      <a:solidFill>
-                        <a:schemeClr val="tx1"/>
-                      </a:solidFill>
-                      <a:prstDash val="solid"/>
-                    </a:lnR>
-                    <a:lnT w="12700">
-                      <a:solidFill>
-                        <a:schemeClr val="tx1"/>
-                      </a:solidFill>
-                      <a:prstDash val="solid"/>
-                    </a:lnT>
-                    <a:lnB w="12700">
-                      <a:solidFill>
-                        <a:schemeClr val="tx1"/>
-                      </a:solidFill>
-                      <a:prstDash val="solid"/>
-                    </a:lnB>
-                    <a:lnTlToBr>
-                      <a:noFill/>
-                    </a:lnTlToBr>
-                    <a:lnBlToTr>
-                      <a:noFill/>
-                    </a:lnBlToTr>
-                    <a:solidFill>
-                      <a:schemeClr val="bg2">
-                        <a:lumMod val="50000"/>
-                      </a:schemeClr>
-                    </a:solidFill>
-                  </a:tcPr>
-                </a:tc>
-              </a:tr>
-              <a:tr h="2607310">
-                <a:tc>
-                  <a:txBody>
-                    <a:bodyPr/>
-                    <a:p>
-                      <a:pPr algn="ctr">
-                        <a:buNone/>
-                      </a:pPr>
-                      <a:endParaRPr lang="en-US" altLang="en-US" sz="1200" b="1"/>
-                    </a:p>
-                    <a:p>
-                      <a:pPr algn="ctr">
-                        <a:buNone/>
-                      </a:pPr>
-                      <a:r>
-                        <a:rPr lang="en-US" altLang="en-US" sz="1200" b="1"/>
-                        <a:t>Result:</a:t>
-                      </a:r>
-                      <a:r>
-                        <a:rPr lang="en-US" altLang="en-US" sz="1200"/>
-                        <a:t> </a:t>
-                      </a:r>
-                      <a:r>
-                        <a:rPr lang="" altLang="en-US" sz="1200"/>
-                        <a:t>Snapthot 2 is deleted. </a:t>
-                      </a:r>
-                      <a:r>
-                        <a:rPr lang="en-US" altLang="en-US" sz="1200"/>
-                        <a:t>Files </a:t>
-                      </a:r>
-                      <a:r>
-                        <a:rPr lang="" altLang="en-US" sz="1200"/>
-                        <a:t>in data changes B </a:t>
-                      </a:r>
-                      <a:r>
-                        <a:rPr lang="en-US" altLang="en-US" sz="1200"/>
-                        <a:t>are </a:t>
-                      </a:r>
-                      <a:r>
-                        <a:rPr lang="" altLang="en-US" sz="1200"/>
-                        <a:t>fully marked </a:t>
-                      </a:r>
-                      <a:r>
-                        <a:rPr lang="en-US" altLang="en-US" sz="1200"/>
-                        <a:t>deleted</a:t>
-                      </a:r>
-                      <a:endParaRPr lang="en-US" altLang="en-US" sz="1200"/>
-                    </a:p>
-                  </a:txBody>
-                  <a:tcPr>
-                    <a:lnL w="12700">
-                      <a:solidFill>
-                        <a:schemeClr val="tx1"/>
-                      </a:solidFill>
-                      <a:prstDash val="solid"/>
-                    </a:lnL>
-                    <a:lnR w="12700">
-                      <a:solidFill>
-                        <a:schemeClr val="tx1"/>
-                      </a:solidFill>
-                      <a:prstDash val="solid"/>
-                    </a:lnR>
-                    <a:lnT w="12700">
-                      <a:solidFill>
-                        <a:schemeClr val="tx1"/>
-                      </a:solidFill>
-                      <a:prstDash val="solid"/>
-                    </a:lnT>
-                    <a:lnB w="12700">
-                      <a:solidFill>
-                        <a:schemeClr val="tx1"/>
-                      </a:solidFill>
-                      <a:prstDash val="solid"/>
-                    </a:lnB>
-                    <a:lnTlToBr>
-                      <a:noFill/>
-                    </a:lnTlToBr>
-                    <a:lnBlToTr>
-                      <a:noFill/>
-                    </a:lnBlToTr>
-                    <a:solidFill>
-                      <a:schemeClr val="bg1"/>
-                    </a:solidFill>
-                  </a:tcPr>
-                </a:tc>
-              </a:tr>
-            </a:tbl>
-          </a:graphicData>
-        </a:graphic>
-      </p:graphicFrame>
-      <p:grpSp>
-        <p:nvGrpSpPr>
-          <p:cNvPr id="19" name="Group 18"/>
-          <p:cNvGrpSpPr/>
-          <p:nvPr/>
-        </p:nvGrpSpPr>
-        <p:grpSpPr>
-          <a:xfrm>
-            <a:off x="4939665" y="5029200"/>
-            <a:ext cx="2311400" cy="1092200"/>
-            <a:chOff x="2145" y="8210"/>
-            <a:chExt cx="3640" cy="1720"/>
-          </a:xfrm>
-        </p:grpSpPr>
-        <p:sp>
-          <p:nvSpPr>
-            <p:cNvPr id="20" name="Flowchart: Magnetic Disk 19"/>
-            <p:cNvSpPr/>
-            <p:nvPr/>
-          </p:nvSpPr>
-          <p:spPr>
-            <a:xfrm>
-              <a:off x="2145" y="8830"/>
-              <a:ext cx="3640" cy="1100"/>
-            </a:xfrm>
-            <a:prstGeom prst="flowChartMagneticDisk">
-              <a:avLst/>
-            </a:prstGeom>
-            <a:solidFill>
-              <a:schemeClr val="accent1">
-                <a:lumMod val="75000"/>
-              </a:schemeClr>
-            </a:solidFill>
-            <a:ln>
-              <a:solidFill>
-                <a:schemeClr val="tx1">
-                  <a:lumMod val="75000"/>
-                  <a:lumOff val="25000"/>
-                </a:schemeClr>
-              </a:solidFill>
-            </a:ln>
-          </p:spPr>
-          <p:style>
-            <a:lnRef idx="2">
-              <a:schemeClr val="accent1">
-                <a:shade val="50000"/>
-              </a:schemeClr>
-            </a:lnRef>
-            <a:fillRef idx="1">
-              <a:schemeClr val="accent1"/>
-            </a:fillRef>
-            <a:effectRef idx="0">
-              <a:schemeClr val="accent1"/>
-            </a:effectRef>
-            <a:fontRef idx="minor">
-              <a:schemeClr val="lt1"/>
-            </a:fontRef>
-          </p:style>
-          <p:txBody>
-            <a:bodyPr rtlCol="0" anchor="ctr"/>
-            <a:p>
-              <a:pPr algn="ctr"/>
-              <a:r>
-                <a:rPr lang="en-US" altLang="en-US" sz="1200">
-                  <a:sym typeface="+mn-ea"/>
-                </a:rPr>
-                <a:t>Data (A)</a:t>
-              </a:r>
-              <a:endParaRPr lang="en-US" altLang="en-US" sz="1200"/>
-            </a:p>
-          </p:txBody>
-        </p:sp>
-        <p:sp>
-          <p:nvSpPr>
-            <p:cNvPr id="21" name="Flowchart: Magnetic Disk 20"/>
-            <p:cNvSpPr/>
-            <p:nvPr/>
-          </p:nvSpPr>
-          <p:spPr>
-            <a:xfrm>
-              <a:off x="2145" y="8703"/>
-              <a:ext cx="3640" cy="500"/>
-            </a:xfrm>
-            <a:prstGeom prst="flowChartMagneticDisk">
-              <a:avLst/>
-            </a:prstGeom>
-            <a:solidFill>
-              <a:srgbClr val="7030A0"/>
-            </a:solidFill>
-            <a:ln>
-              <a:solidFill>
-                <a:schemeClr val="tx1">
-                  <a:lumMod val="75000"/>
-                  <a:lumOff val="25000"/>
-                </a:schemeClr>
-              </a:solidFill>
-            </a:ln>
-          </p:spPr>
-          <p:style>
-            <a:lnRef idx="2">
-              <a:schemeClr val="accent1">
-                <a:shade val="50000"/>
-              </a:schemeClr>
-            </a:lnRef>
-            <a:fillRef idx="1">
-              <a:schemeClr val="accent1"/>
-            </a:fillRef>
-            <a:effectRef idx="0">
-              <a:schemeClr val="accent1"/>
-            </a:effectRef>
-            <a:fontRef idx="minor">
-              <a:schemeClr val="lt1"/>
-            </a:fontRef>
-          </p:style>
-          <p:txBody>
-            <a:bodyPr rtlCol="0" anchor="ctr"/>
-            <a:p>
-              <a:pPr algn="ctr"/>
-              <a:r>
-                <a:rPr lang="en-US" altLang="en-US" sz="1200"/>
-                <a:t>Snapshot 1</a:t>
-              </a:r>
-              <a:endParaRPr lang="en-US" altLang="en-US" sz="1200"/>
-            </a:p>
-          </p:txBody>
-        </p:sp>
-        <p:sp>
-          <p:nvSpPr>
-            <p:cNvPr id="24" name="Flowchart: Magnetic Disk 23"/>
-            <p:cNvSpPr/>
-            <p:nvPr/>
-          </p:nvSpPr>
-          <p:spPr>
-            <a:xfrm>
-              <a:off x="2145" y="8210"/>
-              <a:ext cx="3640" cy="659"/>
-            </a:xfrm>
-            <a:prstGeom prst="flowChartMagneticDisk">
-              <a:avLst/>
-            </a:prstGeom>
-            <a:solidFill>
-              <a:schemeClr val="accent1">
-                <a:lumMod val="75000"/>
-              </a:schemeClr>
-            </a:solidFill>
-            <a:ln>
-              <a:solidFill>
-                <a:schemeClr val="tx1">
-                  <a:lumMod val="75000"/>
-                  <a:lumOff val="25000"/>
-                </a:schemeClr>
-              </a:solidFill>
-            </a:ln>
-          </p:spPr>
-          <p:style>
-            <a:lnRef idx="2">
-              <a:schemeClr val="accent1">
-                <a:shade val="50000"/>
-              </a:schemeClr>
-            </a:lnRef>
-            <a:fillRef idx="1">
-              <a:schemeClr val="accent1"/>
-            </a:fillRef>
-            <a:effectRef idx="0">
-              <a:schemeClr val="accent1"/>
-            </a:effectRef>
-            <a:fontRef idx="minor">
-              <a:schemeClr val="lt1"/>
-            </a:fontRef>
-          </p:style>
-          <p:txBody>
-            <a:bodyPr rtlCol="0" anchor="ctr"/>
-            <a:p>
-              <a:pPr algn="ctr"/>
-              <a:r>
-                <a:rPr lang="en-US" altLang="en-US" sz="1200">
-                  <a:sym typeface="+mn-ea"/>
-                </a:rPr>
-                <a:t>Data Changes (</a:t>
-              </a:r>
-              <a:r>
-                <a:rPr lang="" altLang="en-US" sz="1200">
-                  <a:sym typeface="+mn-ea"/>
-                </a:rPr>
-                <a:t>C</a:t>
-              </a:r>
-              <a:r>
-                <a:rPr lang="en-US" altLang="en-US" sz="1200">
-                  <a:sym typeface="+mn-ea"/>
-                </a:rPr>
-                <a:t>)</a:t>
-              </a:r>
-              <a:endParaRPr lang="en-US" altLang="en-US" sz="1200">
-                <a:sym typeface="+mn-ea"/>
-              </a:endParaRPr>
-            </a:p>
-          </p:txBody>
-        </p:sp>
-      </p:grpSp>
-      <p:graphicFrame>
-        <p:nvGraphicFramePr>
-          <p:cNvPr id="32" name="Table 31"/>
-          <p:cNvGraphicFramePr/>
-          <p:nvPr/>
-        </p:nvGraphicFramePr>
-        <p:xfrm>
-          <a:off x="8018145" y="3285490"/>
-          <a:ext cx="3552825" cy="2971800"/>
-        </p:xfrm>
-        <a:graphic>
-          <a:graphicData uri="http://schemas.openxmlformats.org/drawingml/2006/table">
-            <a:tbl>
-              <a:tblPr firstRow="true">
-                <a:tableStyleId>{5202B0CA-FC54-4496-8BCA-5EF66A818D29}</a:tableStyleId>
-              </a:tblPr>
-              <a:tblGrid>
-                <a:gridCol w="3552825"/>
-              </a:tblGrid>
-              <a:tr h="364490">
-                <a:tc>
-                  <a:txBody>
-                    <a:bodyPr/>
-                    <a:p>
-                      <a:pPr algn="ctr">
-                        <a:buNone/>
-                      </a:pPr>
-                      <a:r>
-                        <a:rPr lang="en-US" altLang="en-US" sz="1600"/>
-                        <a:t>Delete Snapshot </a:t>
-                      </a:r>
-                      <a:r>
-                        <a:rPr lang="" altLang="en-US" sz="1600"/>
-                        <a:t>1</a:t>
+                        <a:t>Delete Snapshot 2</a:t>
                       </a:r>
                       <a:endParaRPr lang="en-US" altLang="en-US" sz="1600"/>
                     </a:p>
@@ -9034,13 +8632,335 @@
                       </a:r>
                       <a:r>
                         <a:rPr lang="en-US" altLang="en-US" sz="1200"/>
-                        <a:t> </a:t>
+                        <a:t> Snapthot 2 is deleted. Files in data changes B are fully marked deleted</a:t>
+                      </a:r>
+                      <a:endParaRPr lang="en-US" altLang="en-US" sz="1200"/>
+                    </a:p>
+                  </a:txBody>
+                  <a:tcPr>
+                    <a:lnL w="12700">
+                      <a:solidFill>
+                        <a:schemeClr val="tx1"/>
+                      </a:solidFill>
+                      <a:prstDash val="solid"/>
+                    </a:lnL>
+                    <a:lnR w="12700">
+                      <a:solidFill>
+                        <a:schemeClr val="tx1"/>
+                      </a:solidFill>
+                      <a:prstDash val="solid"/>
+                    </a:lnR>
+                    <a:lnT w="12700">
+                      <a:solidFill>
+                        <a:schemeClr val="tx1"/>
+                      </a:solidFill>
+                      <a:prstDash val="solid"/>
+                    </a:lnT>
+                    <a:lnB w="12700">
+                      <a:solidFill>
+                        <a:schemeClr val="tx1"/>
+                      </a:solidFill>
+                      <a:prstDash val="solid"/>
+                    </a:lnB>
+                    <a:lnTlToBr>
+                      <a:noFill/>
+                    </a:lnTlToBr>
+                    <a:lnBlToTr>
+                      <a:noFill/>
+                    </a:lnBlToTr>
+                    <a:solidFill>
+                      <a:schemeClr val="bg1"/>
+                    </a:solidFill>
+                  </a:tcPr>
+                </a:tc>
+              </a:tr>
+            </a:tbl>
+          </a:graphicData>
+        </a:graphic>
+      </p:graphicFrame>
+      <p:grpSp>
+        <p:nvGrpSpPr>
+          <p:cNvPr id="19" name="Group 18"/>
+          <p:cNvGrpSpPr/>
+          <p:nvPr/>
+        </p:nvGrpSpPr>
+        <p:grpSpPr>
+          <a:xfrm>
+            <a:off x="4939665" y="5029200"/>
+            <a:ext cx="2311400" cy="1092200"/>
+            <a:chOff x="2145" y="8210"/>
+            <a:chExt cx="3640" cy="1720"/>
+          </a:xfrm>
+        </p:grpSpPr>
+        <p:sp>
+          <p:nvSpPr>
+            <p:cNvPr id="20" name="Flowchart: Magnetic Disk 19"/>
+            <p:cNvSpPr/>
+            <p:nvPr/>
+          </p:nvSpPr>
+          <p:spPr>
+            <a:xfrm>
+              <a:off x="2145" y="8830"/>
+              <a:ext cx="3640" cy="1100"/>
+            </a:xfrm>
+            <a:prstGeom prst="flowChartMagneticDisk">
+              <a:avLst/>
+            </a:prstGeom>
+            <a:solidFill>
+              <a:schemeClr val="accent1">
+                <a:lumMod val="75000"/>
+              </a:schemeClr>
+            </a:solidFill>
+            <a:ln>
+              <a:solidFill>
+                <a:schemeClr val="tx1">
+                  <a:lumMod val="75000"/>
+                  <a:lumOff val="25000"/>
+                </a:schemeClr>
+              </a:solidFill>
+            </a:ln>
+          </p:spPr>
+          <p:style>
+            <a:lnRef idx="2">
+              <a:schemeClr val="accent1">
+                <a:shade val="50000"/>
+              </a:schemeClr>
+            </a:lnRef>
+            <a:fillRef idx="1">
+              <a:schemeClr val="accent1"/>
+            </a:fillRef>
+            <a:effectRef idx="0">
+              <a:schemeClr val="accent1"/>
+            </a:effectRef>
+            <a:fontRef idx="minor">
+              <a:schemeClr val="lt1"/>
+            </a:fontRef>
+          </p:style>
+          <p:txBody>
+            <a:bodyPr rtlCol="0" anchor="ctr"/>
+            <a:p>
+              <a:pPr algn="ctr"/>
+              <a:r>
+                <a:rPr lang="en-US" altLang="en-US" sz="1200">
+                  <a:sym typeface="+mn-ea"/>
+                </a:rPr>
+                <a:t>Data (A)</a:t>
+              </a:r>
+              <a:endParaRPr lang="en-US" altLang="en-US" sz="1200"/>
+            </a:p>
+          </p:txBody>
+        </p:sp>
+        <p:sp>
+          <p:nvSpPr>
+            <p:cNvPr id="21" name="Flowchart: Magnetic Disk 20"/>
+            <p:cNvSpPr/>
+            <p:nvPr/>
+          </p:nvSpPr>
+          <p:spPr>
+            <a:xfrm>
+              <a:off x="2145" y="8703"/>
+              <a:ext cx="3640" cy="500"/>
+            </a:xfrm>
+            <a:prstGeom prst="flowChartMagneticDisk">
+              <a:avLst/>
+            </a:prstGeom>
+            <a:solidFill>
+              <a:srgbClr val="7030A0"/>
+            </a:solidFill>
+            <a:ln>
+              <a:solidFill>
+                <a:schemeClr val="tx1">
+                  <a:lumMod val="75000"/>
+                  <a:lumOff val="25000"/>
+                </a:schemeClr>
+              </a:solidFill>
+            </a:ln>
+          </p:spPr>
+          <p:style>
+            <a:lnRef idx="2">
+              <a:schemeClr val="accent1">
+                <a:shade val="50000"/>
+              </a:schemeClr>
+            </a:lnRef>
+            <a:fillRef idx="1">
+              <a:schemeClr val="accent1"/>
+            </a:fillRef>
+            <a:effectRef idx="0">
+              <a:schemeClr val="accent1"/>
+            </a:effectRef>
+            <a:fontRef idx="minor">
+              <a:schemeClr val="lt1"/>
+            </a:fontRef>
+          </p:style>
+          <p:txBody>
+            <a:bodyPr rtlCol="0" anchor="ctr"/>
+            <a:p>
+              <a:pPr algn="ctr"/>
+              <a:r>
+                <a:rPr lang="en-US" altLang="en-US" sz="1200"/>
+                <a:t>Snapshot 1</a:t>
+              </a:r>
+              <a:endParaRPr lang="en-US" altLang="en-US" sz="1200"/>
+            </a:p>
+          </p:txBody>
+        </p:sp>
+        <p:sp>
+          <p:nvSpPr>
+            <p:cNvPr id="24" name="Flowchart: Magnetic Disk 23"/>
+            <p:cNvSpPr/>
+            <p:nvPr/>
+          </p:nvSpPr>
+          <p:spPr>
+            <a:xfrm>
+              <a:off x="2145" y="8210"/>
+              <a:ext cx="3640" cy="659"/>
+            </a:xfrm>
+            <a:prstGeom prst="flowChartMagneticDisk">
+              <a:avLst/>
+            </a:prstGeom>
+            <a:solidFill>
+              <a:schemeClr val="accent1">
+                <a:lumMod val="75000"/>
+              </a:schemeClr>
+            </a:solidFill>
+            <a:ln>
+              <a:solidFill>
+                <a:schemeClr val="tx1">
+                  <a:lumMod val="75000"/>
+                  <a:lumOff val="25000"/>
+                </a:schemeClr>
+              </a:solidFill>
+            </a:ln>
+          </p:spPr>
+          <p:style>
+            <a:lnRef idx="2">
+              <a:schemeClr val="accent1">
+                <a:shade val="50000"/>
+              </a:schemeClr>
+            </a:lnRef>
+            <a:fillRef idx="1">
+              <a:schemeClr val="accent1"/>
+            </a:fillRef>
+            <a:effectRef idx="0">
+              <a:schemeClr val="accent1"/>
+            </a:effectRef>
+            <a:fontRef idx="minor">
+              <a:schemeClr val="lt1"/>
+            </a:fontRef>
+          </p:style>
+          <p:txBody>
+            <a:bodyPr rtlCol="0" anchor="ctr"/>
+            <a:p>
+              <a:pPr algn="ctr"/>
+              <a:r>
+                <a:rPr lang="en-US" altLang="en-US" sz="1200">
+                  <a:sym typeface="+mn-ea"/>
+                </a:rPr>
+                <a:t>Data Changes (C)</a:t>
+              </a:r>
+              <a:endParaRPr lang="en-US" altLang="en-US" sz="1200">
+                <a:sym typeface="+mn-ea"/>
+              </a:endParaRPr>
+            </a:p>
+          </p:txBody>
+        </p:sp>
+      </p:grpSp>
+      <p:graphicFrame>
+        <p:nvGraphicFramePr>
+          <p:cNvPr id="32" name="Table 31"/>
+          <p:cNvGraphicFramePr/>
+          <p:nvPr/>
+        </p:nvGraphicFramePr>
+        <p:xfrm>
+          <a:off x="8018145" y="3285490"/>
+          <a:ext cx="3552825" cy="2971800"/>
+        </p:xfrm>
+        <a:graphic>
+          <a:graphicData uri="http://schemas.openxmlformats.org/drawingml/2006/table">
+            <a:tbl>
+              <a:tblPr firstRow="true">
+                <a:tableStyleId>{5202B0CA-FC54-4496-8BCA-5EF66A818D29}</a:tableStyleId>
+              </a:tblPr>
+              <a:tblGrid>
+                <a:gridCol w="3552825"/>
+              </a:tblGrid>
+              <a:tr h="364490">
+                <a:tc>
+                  <a:txBody>
+                    <a:bodyPr/>
+                    <a:p>
+                      <a:pPr algn="ctr">
+                        <a:buNone/>
+                      </a:pPr>
+                      <a:r>
+                        <a:rPr lang="en-US" altLang="en-US" sz="1600"/>
+                        <a:t>Delete Snapshot 1</a:t>
+                      </a:r>
+                      <a:endParaRPr lang="en-US" altLang="en-US" sz="1600"/>
+                    </a:p>
+                  </a:txBody>
+                  <a:tcPr>
+                    <a:lnL w="12700">
+                      <a:solidFill>
+                        <a:schemeClr val="tx1"/>
+                      </a:solidFill>
+                      <a:prstDash val="solid"/>
+                    </a:lnL>
+                    <a:lnR w="12700">
+                      <a:solidFill>
+                        <a:schemeClr val="tx1"/>
+                      </a:solidFill>
+                      <a:prstDash val="solid"/>
+                    </a:lnR>
+                    <a:lnT w="12700">
+                      <a:solidFill>
+                        <a:schemeClr val="tx1"/>
+                      </a:solidFill>
+                      <a:prstDash val="solid"/>
+                    </a:lnT>
+                    <a:lnB w="12700">
+                      <a:solidFill>
+                        <a:schemeClr val="tx1"/>
+                      </a:solidFill>
+                      <a:prstDash val="solid"/>
+                    </a:lnB>
+                    <a:lnTlToBr>
+                      <a:noFill/>
+                    </a:lnTlToBr>
+                    <a:lnBlToTr>
+                      <a:noFill/>
+                    </a:lnBlToTr>
+                    <a:solidFill>
+                      <a:schemeClr val="bg2">
+                        <a:lumMod val="50000"/>
+                      </a:schemeClr>
+                    </a:solidFill>
+                  </a:tcPr>
+                </a:tc>
+              </a:tr>
+              <a:tr h="2607310">
+                <a:tc>
+                  <a:txBody>
+                    <a:bodyPr/>
+                    <a:p>
+                      <a:pPr algn="ctr">
+                        <a:buNone/>
+                      </a:pPr>
+                      <a:endParaRPr lang="en-US" altLang="en-US" sz="1200" b="1"/>
+                    </a:p>
+                    <a:p>
+                      <a:pPr algn="ctr">
+                        <a:buNone/>
+                      </a:pPr>
+                      <a:r>
+                        <a:rPr lang="en-US" altLang="en-US" sz="1200" b="1"/>
+                        <a:t>Result:</a:t>
                       </a:r>
                       <a:r>
-                        <a:rPr lang="" altLang="en-US" sz="1200"/>
-                        <a:t>Snapshot 1 is deleted. Files are not touched</a:t>
+                        <a:rPr lang="en-US" altLang="en-US" sz="1200"/>
+                        <a:t> Snapshot 1 is deleted. Files are not touched</a:t>
                       </a:r>
-                      <a:endParaRPr lang="" altLang="en-US" sz="1200"/>
+                      <a:endParaRPr lang="en-US" altLang="en-US" sz="1200"/>
                     </a:p>
                   </a:txBody>
                   <a:tcPr>
@@ -9208,19 +9128,7 @@
                 <a:rPr lang="en-US" altLang="en-US" sz="1200">
                   <a:sym typeface="+mn-ea"/>
                 </a:rPr>
-                <a:t>Data Changes (</a:t>
-              </a:r>
-              <a:r>
-                <a:rPr lang="" altLang="en-US" sz="1200">
-                  <a:sym typeface="+mn-ea"/>
-                </a:rPr>
-                <a:t>C</a:t>
-              </a:r>
-              <a:r>
-                <a:rPr lang="en-US" altLang="en-US" sz="1200">
-                  <a:sym typeface="+mn-ea"/>
-                </a:rPr>
-                <a:t>)</a:t>
+                <a:t>Data Changes (C)</a:t>
               </a:r>
               <a:endParaRPr lang="en-US" altLang="en-US" sz="1200">
                 <a:sym typeface="+mn-ea"/>
@@ -9533,10 +9441,10 @@
             <a:p>
               <a:pPr algn="ctr"/>
               <a:r>
-                <a:rPr lang="" altLang="en-US" sz="1200"/>
+                <a:rPr lang="en-US" altLang="en-US" sz="1200"/>
                 <a:t>Data (A)</a:t>
               </a:r>
-              <a:endParaRPr lang="" altLang="en-US" sz="1200"/>
+              <a:endParaRPr lang="en-US" altLang="en-US" sz="1200"/>
             </a:p>
           </p:txBody>
         </p:sp>
@@ -9676,10 +9584,10 @@
             <a:p>
               <a:pPr algn="ctr"/>
               <a:r>
-                <a:rPr lang="" altLang="en-US" sz="1200"/>
+                <a:rPr lang="en-US" altLang="en-US" sz="1200"/>
                 <a:t>Data (A)</a:t>
               </a:r>
-              <a:endParaRPr lang="" altLang="en-US" sz="1200"/>
+              <a:endParaRPr lang="en-US" altLang="en-US" sz="1200"/>
             </a:p>
           </p:txBody>
         </p:sp>
@@ -9786,12 +9694,12 @@
             <a:p>
               <a:pPr algn="ctr"/>
               <a:r>
-                <a:rPr lang="" altLang="en-US" sz="1200">
+                <a:rPr lang="en-US" altLang="en-US" sz="1200">
                   <a:sym typeface="+mn-ea"/>
                 </a:rPr>
                 <a:t>Data Changes (B)</a:t>
               </a:r>
-              <a:endParaRPr lang="" altLang="en-US" sz="1200">
+              <a:endParaRPr lang="en-US" altLang="en-US" sz="1200">
                 <a:sym typeface="+mn-ea"/>
               </a:endParaRPr>
             </a:p>
@@ -9906,7 +9814,7 @@
                 <a:t>Data Changes (</a:t>
               </a:r>
               <a:r>
-                <a:rPr lang="" sz="1200">
+                <a:rPr lang="en-US" sz="1200">
                   <a:sym typeface="+mn-ea"/>
                 </a:rPr>
                 <a:t>C</a:t>
@@ -10021,38 +9929,32 @@
           <a:p>
             <a:pPr algn="l"/>
             <a:r>
-              <a:rPr lang="" altLang="en-US" sz="900" b="1"/>
+              <a:rPr lang="en-US" altLang="en-US" sz="900" b="1"/>
               <a:t>Snapshot 2</a:t>
             </a:r>
-            <a:endParaRPr lang="" altLang="en-US" sz="900" b="1"/>
+            <a:endParaRPr lang="en-US" altLang="en-US" sz="900" b="1"/>
           </a:p>
           <a:p>
             <a:pPr algn="l"/>
             <a:r>
-              <a:rPr lang="" altLang="en-US" sz="800"/>
+              <a:rPr lang="en-US" altLang="en-US" sz="800"/>
               <a:t>- Data changes (B)</a:t>
             </a:r>
-            <a:endParaRPr lang="" altLang="en-US" sz="800"/>
+            <a:endParaRPr lang="en-US" altLang="en-US" sz="800"/>
           </a:p>
           <a:p>
             <a:pPr algn="l"/>
             <a:r>
-              <a:rPr lang="" altLang="en-US" sz="800"/>
+              <a:rPr lang="en-US" altLang="en-US" sz="800"/>
               <a:t>- </a:t>
             </a:r>
             <a:r>
               <a:rPr lang="en-US" altLang="en-US" sz="800">
                 <a:sym typeface="+mn-ea"/>
               </a:rPr>
-              <a:t>Data</a:t>
+              <a:t>Data (A)</a:t>
             </a:r>
-            <a:r>
-              <a:rPr lang="" altLang="en-US" sz="800">
-                <a:sym typeface="+mn-ea"/>
-              </a:rPr>
-              <a:t> (A)</a:t>
-            </a:r>
-            <a:endParaRPr lang="" altLang="en-US" sz="800">
+            <a:endParaRPr lang="en-US" altLang="en-US" sz="800">
               <a:sym typeface="+mn-ea"/>
             </a:endParaRPr>
           </a:p>
@@ -10081,28 +9983,16 @@
           <a:p>
             <a:r>
               <a:rPr lang="en-US" altLang="en-US" sz="900" b="1"/>
-              <a:t>Snapshot </a:t>
-            </a:r>
-            <a:r>
-              <a:rPr lang="" altLang="en-US" sz="900" b="1"/>
-              <a:t>1</a:t>
-            </a:r>
-            <a:r>
-              <a:rPr lang="en-US" altLang="en-US" sz="900" b="1"/>
-              <a:t> </a:t>
+              <a:t>Snapshot 1 </a:t>
             </a:r>
             <a:endParaRPr lang="en-US" altLang="en-US" sz="900" b="1"/>
           </a:p>
           <a:p>
             <a:r>
               <a:rPr lang="en-US" altLang="en-US" sz="800"/>
-              <a:t>- </a:t>
+              <a:t>- Data (A)</a:t>
             </a:r>
-            <a:r>
-              <a:rPr lang="" altLang="en-US" sz="800"/>
-              <a:t>Data (A)</a:t>
-            </a:r>
-            <a:endParaRPr lang="" altLang="en-US" sz="800"/>
+            <a:endParaRPr lang="en-US" altLang="en-US" sz="800"/>
           </a:p>
         </p:txBody>
       </p:sp>

</xml_diff>